<commit_message>
adding readme and new datamodel
</commit_message>
<xml_diff>
--- a/data_model.pptx
+++ b/data_model.pptx
@@ -104,6 +104,11 @@
       </a:defRPr>
     </a:lvl9pPr>
   </p:defaultTextStyle>
+  <p:extLst>
+    <p:ext uri="{EFAFB233-063F-42B5-8137-9DF3F51BA10A}">
+      <p15:sldGuideLst xmlns:p15="http://schemas.microsoft.com/office/powerpoint/2012/main"/>
+    </p:ext>
+  </p:extLst>
 </p:presentation>
 </file>
 
@@ -4877,7 +4882,7 @@
         <p:spPr>
           <a:xfrm>
             <a:off x="2904379" y="5280825"/>
-            <a:ext cx="1498356" cy="1097612"/>
+            <a:ext cx="1498356" cy="1332626"/>
           </a:xfrm>
           <a:custGeom>
             <a:avLst/>
@@ -4932,6 +4937,66 @@
               <a:gd name="connsiteY5" fmla="*/ 1097612 h 1097612"/>
               <a:gd name="connsiteX6" fmla="*/ 0 w 1884474"/>
               <a:gd name="connsiteY6" fmla="*/ 0 h 1097612"/>
+              <a:gd name="connsiteX0" fmla="*/ 0 w 1884474"/>
+              <a:gd name="connsiteY0" fmla="*/ 0 h 1097612"/>
+              <a:gd name="connsiteX1" fmla="*/ 1883798 w 1884474"/>
+              <a:gd name="connsiteY1" fmla="*/ 0 h 1097612"/>
+              <a:gd name="connsiteX2" fmla="*/ 1884399 w 1884474"/>
+              <a:gd name="connsiteY2" fmla="*/ 575122 h 1097612"/>
+              <a:gd name="connsiteX3" fmla="*/ 1884399 w 1884474"/>
+              <a:gd name="connsiteY3" fmla="*/ 905663 h 1097612"/>
+              <a:gd name="connsiteX4" fmla="*/ 1883798 w 1884474"/>
+              <a:gd name="connsiteY4" fmla="*/ 1097612 h 1097612"/>
+              <a:gd name="connsiteX5" fmla="*/ 0 w 1884474"/>
+              <a:gd name="connsiteY5" fmla="*/ 1097612 h 1097612"/>
+              <a:gd name="connsiteX6" fmla="*/ 0 w 1884474"/>
+              <a:gd name="connsiteY6" fmla="*/ 0 h 1097612"/>
+              <a:gd name="connsiteX0" fmla="*/ 0 w 1884474"/>
+              <a:gd name="connsiteY0" fmla="*/ 0 h 1097612"/>
+              <a:gd name="connsiteX1" fmla="*/ 1883798 w 1884474"/>
+              <a:gd name="connsiteY1" fmla="*/ 0 h 1097612"/>
+              <a:gd name="connsiteX2" fmla="*/ 1884399 w 1884474"/>
+              <a:gd name="connsiteY2" fmla="*/ 575122 h 1097612"/>
+              <a:gd name="connsiteX3" fmla="*/ 1884399 w 1884474"/>
+              <a:gd name="connsiteY3" fmla="*/ 730514 h 1097612"/>
+              <a:gd name="connsiteX4" fmla="*/ 1883798 w 1884474"/>
+              <a:gd name="connsiteY4" fmla="*/ 1097612 h 1097612"/>
+              <a:gd name="connsiteX5" fmla="*/ 0 w 1884474"/>
+              <a:gd name="connsiteY5" fmla="*/ 1097612 h 1097612"/>
+              <a:gd name="connsiteX6" fmla="*/ 0 w 1884474"/>
+              <a:gd name="connsiteY6" fmla="*/ 0 h 1097612"/>
+              <a:gd name="connsiteX0" fmla="*/ 15499 w 1899973"/>
+              <a:gd name="connsiteY0" fmla="*/ 0 h 1097612"/>
+              <a:gd name="connsiteX1" fmla="*/ 1899297 w 1899973"/>
+              <a:gd name="connsiteY1" fmla="*/ 0 h 1097612"/>
+              <a:gd name="connsiteX2" fmla="*/ 1899898 w 1899973"/>
+              <a:gd name="connsiteY2" fmla="*/ 575122 h 1097612"/>
+              <a:gd name="connsiteX3" fmla="*/ 1899898 w 1899973"/>
+              <a:gd name="connsiteY3" fmla="*/ 730514 h 1097612"/>
+              <a:gd name="connsiteX4" fmla="*/ 1899297 w 1899973"/>
+              <a:gd name="connsiteY4" fmla="*/ 1097612 h 1097612"/>
+              <a:gd name="connsiteX5" fmla="*/ 15499 w 1899973"/>
+              <a:gd name="connsiteY5" fmla="*/ 1097612 h 1097612"/>
+              <a:gd name="connsiteX6" fmla="*/ 0 w 1899973"/>
+              <a:gd name="connsiteY6" fmla="*/ 589679 h 1097612"/>
+              <a:gd name="connsiteX7" fmla="*/ 15499 w 1899973"/>
+              <a:gd name="connsiteY7" fmla="*/ 0 h 1097612"/>
+              <a:gd name="connsiteX0" fmla="*/ 0 w 1884474"/>
+              <a:gd name="connsiteY0" fmla="*/ 0 h 1097612"/>
+              <a:gd name="connsiteX1" fmla="*/ 1883798 w 1884474"/>
+              <a:gd name="connsiteY1" fmla="*/ 0 h 1097612"/>
+              <a:gd name="connsiteX2" fmla="*/ 1884399 w 1884474"/>
+              <a:gd name="connsiteY2" fmla="*/ 575122 h 1097612"/>
+              <a:gd name="connsiteX3" fmla="*/ 1884399 w 1884474"/>
+              <a:gd name="connsiteY3" fmla="*/ 730514 h 1097612"/>
+              <a:gd name="connsiteX4" fmla="*/ 1883798 w 1884474"/>
+              <a:gd name="connsiteY4" fmla="*/ 1097612 h 1097612"/>
+              <a:gd name="connsiteX5" fmla="*/ 0 w 1884474"/>
+              <a:gd name="connsiteY5" fmla="*/ 1097612 h 1097612"/>
+              <a:gd name="connsiteX6" fmla="*/ 11246 w 1884474"/>
+              <a:gd name="connsiteY6" fmla="*/ 589679 h 1097612"/>
+              <a:gd name="connsiteX7" fmla="*/ 0 w 1884474"/>
+              <a:gd name="connsiteY7" fmla="*/ 0 h 1097612"/>
             </a:gdLst>
             <a:ahLst/>
             <a:cxnLst>
@@ -4956,6 +5021,9 @@
               <a:cxn ang="0">
                 <a:pos x="connsiteX6" y="connsiteY6"/>
               </a:cxn>
+              <a:cxn ang="0">
+                <a:pos x="connsiteX7" y="connsiteY7"/>
+              </a:cxn>
             </a:cxnLst>
             <a:rect l="l" t="t" r="r" b="b"/>
             <a:pathLst>
@@ -4968,21 +5036,24 @@
                 </a:lnTo>
                 <a:cubicBezTo>
                   <a:pt x="1883998" y="229656"/>
-                  <a:pt x="1884199" y="459313"/>
-                  <a:pt x="1884399" y="688969"/>
+                  <a:pt x="1884199" y="345466"/>
+                  <a:pt x="1884399" y="575122"/>
                 </a:cubicBezTo>
                 <a:cubicBezTo>
-                  <a:pt x="1884499" y="839913"/>
-                  <a:pt x="1884499" y="837556"/>
-                  <a:pt x="1884399" y="905663"/>
+                  <a:pt x="1884499" y="726066"/>
+                  <a:pt x="1884499" y="662407"/>
+                  <a:pt x="1884399" y="730514"/>
                 </a:cubicBezTo>
                 <a:cubicBezTo>
-                  <a:pt x="1884199" y="969646"/>
+                  <a:pt x="1884199" y="794497"/>
                   <a:pt x="1883998" y="1033629"/>
                   <a:pt x="1883798" y="1097612"/>
                 </a:cubicBezTo>
                 <a:lnTo>
                   <a:pt x="0" y="1097612"/>
+                </a:lnTo>
+                <a:lnTo>
+                  <a:pt x="11246" y="589679"/>
                 </a:lnTo>
                 <a:lnTo>
                   <a:pt x="0" y="0"/>
@@ -5138,6 +5209,28 @@
                 </a:solidFill>
               </a:rPr>
               <a:t>task.id</a:t>
+            </a:r>
+          </a:p>
+          <a:p>
+            <a:pPr algn="r"/>
+            <a:r>
+              <a:rPr lang="en-GB" sz="1200">
+                <a:solidFill>
+                  <a:schemeClr val="tx1">
+                    <a:lumMod val="65000"/>
+                    <a:lumOff val="35000"/>
+                  </a:schemeClr>
+                </a:solidFill>
+              </a:rPr>
+              <a:t>contribution</a:t>
+            </a:r>
+            <a:r>
+              <a:rPr lang="en-GB" sz="800">
+                <a:solidFill>
+                  <a:schemeClr val="accent1"/>
+                </a:solidFill>
+              </a:rPr>
+              <a:t> CRITICAL | MAJOR | MINOR | DESRISKING </a:t>
             </a:r>
           </a:p>
           <a:p>
@@ -6049,8 +6142,8 @@
         </p:nvCxnSpPr>
         <p:spPr>
           <a:xfrm flipV="1">
-            <a:off x="4402675" y="5127626"/>
-            <a:ext cx="312200" cy="1058862"/>
+            <a:off x="4402675" y="5127628"/>
+            <a:ext cx="312200" cy="1040124"/>
           </a:xfrm>
           <a:prstGeom prst="bentConnector2">
             <a:avLst/>
@@ -6091,8 +6184,8 @@
         </p:nvCxnSpPr>
         <p:spPr>
           <a:xfrm flipV="1">
-            <a:off x="4402675" y="5127626"/>
-            <a:ext cx="312200" cy="842168"/>
+            <a:off x="4402675" y="5127627"/>
+            <a:ext cx="312200" cy="851462"/>
           </a:xfrm>
           <a:prstGeom prst="bentConnector2">
             <a:avLst/>
@@ -6116,6 +6209,113 @@
           </a:fontRef>
         </p:style>
       </p:cxnSp>
+      <p:cxnSp>
+        <p:nvCxnSpPr>
+          <p:cNvPr id="20" name="Connector: Elbow 19">
+            <a:extLst>
+              <a:ext uri="{FF2B5EF4-FFF2-40B4-BE49-F238E27FC236}">
+                <a16:creationId xmlns:a16="http://schemas.microsoft.com/office/drawing/2014/main" id="{573D3D7A-82A1-4472-B9CE-E5E41CF3A451}"/>
+              </a:ext>
+            </a:extLst>
+          </p:cNvPr>
+          <p:cNvCxnSpPr>
+            <a:cxnSpLocks/>
+            <a:stCxn id="9" idx="6"/>
+          </p:cNvCxnSpPr>
+          <p:nvPr/>
+        </p:nvCxnSpPr>
+        <p:spPr>
+          <a:xfrm flipV="1">
+            <a:off x="2913321" y="3776561"/>
+            <a:ext cx="393429" cy="2220201"/>
+          </a:xfrm>
+          <a:prstGeom prst="bentConnector5">
+            <a:avLst>
+              <a:gd name="adj1" fmla="val -120262"/>
+              <a:gd name="adj2" fmla="val 99901"/>
+              <a:gd name="adj3" fmla="val 41895"/>
+            </a:avLst>
+          </a:prstGeom>
+          <a:ln>
+            <a:tailEnd type="triangle"/>
+          </a:ln>
+        </p:spPr>
+        <p:style>
+          <a:lnRef idx="1">
+            <a:schemeClr val="accent1"/>
+          </a:lnRef>
+          <a:fillRef idx="0">
+            <a:schemeClr val="accent1"/>
+          </a:fillRef>
+          <a:effectRef idx="0">
+            <a:schemeClr val="accent1"/>
+          </a:effectRef>
+          <a:fontRef idx="minor">
+            <a:schemeClr val="tx1"/>
+          </a:fontRef>
+        </p:style>
+      </p:cxnSp>
+      <p:sp>
+        <p:nvSpPr>
+          <p:cNvPr id="31" name="Rectangle 30">
+            <a:extLst>
+              <a:ext uri="{FF2B5EF4-FFF2-40B4-BE49-F238E27FC236}">
+                <a16:creationId xmlns:a16="http://schemas.microsoft.com/office/drawing/2014/main" id="{91ABE842-1832-4488-89FE-06FB7AA1F921}"/>
+              </a:ext>
+            </a:extLst>
+          </p:cNvPr>
+          <p:cNvSpPr/>
+          <p:nvPr/>
+        </p:nvSpPr>
+        <p:spPr>
+          <a:xfrm>
+            <a:off x="1343109" y="4509269"/>
+            <a:ext cx="1548822" cy="577081"/>
+          </a:xfrm>
+          <a:prstGeom prst="rect">
+            <a:avLst/>
+          </a:prstGeom>
+          <a:solidFill>
+            <a:srgbClr val="F2F2F2"/>
+          </a:solidFill>
+        </p:spPr>
+        <p:txBody>
+          <a:bodyPr wrap="none">
+            <a:spAutoFit/>
+          </a:bodyPr>
+          <a:lstStyle/>
+          <a:p>
+            <a:r>
+              <a:rPr lang="en-GB" sz="1050" i="1">
+                <a:solidFill>
+                  <a:srgbClr val="4472C4"/>
+                </a:solidFill>
+              </a:rPr>
+              <a:t>&lt; calculate priority based</a:t>
+            </a:r>
+          </a:p>
+          <a:p>
+            <a:r>
+              <a:rPr lang="en-GB" sz="1050" i="1">
+                <a:solidFill>
+                  <a:srgbClr val="4472C4"/>
+                </a:solidFill>
+              </a:rPr>
+              <a:t> on priority of driver and </a:t>
+            </a:r>
+          </a:p>
+          <a:p>
+            <a:r>
+              <a:rPr lang="en-GB" sz="1050" i="1">
+                <a:solidFill>
+                  <a:srgbClr val="4472C4"/>
+                </a:solidFill>
+              </a:rPr>
+              <a:t>contributions of tasks &gt;</a:t>
+            </a:r>
+          </a:p>
+        </p:txBody>
+      </p:sp>
     </p:spTree>
     <p:extLst>
       <p:ext uri="{BB962C8B-B14F-4D97-AF65-F5344CB8AC3E}">

</xml_diff>